<commit_message>
Added state machine slides
</commit_message>
<xml_diff>
--- a/Lectures/Game AI 3.pptx
+++ b/Lectures/Game AI 3.pptx
@@ -248,7 +248,7 @@
           <a:p>
             <a:fld id="{8B5F6ADF-76BE-4E67-B3A7-E4E519D3E160}" type="datetimeFigureOut">
               <a:rPr lang="en-IE" smtClean="0"/>
-              <a:t>24/03/2014</a:t>
+              <a:t>26/03/2014</a:t>
             </a:fld>
             <a:endParaRPr lang="en-IE"/>
           </a:p>
@@ -1948,7 +1948,7 @@
           <a:p>
             <a:fld id="{6FA70D29-463A-43D6-BBEF-693D30580A1C}" type="datetimeFigureOut">
               <a:rPr lang="en-IE" smtClean="0"/>
-              <a:t>24/03/2014</a:t>
+              <a:t>26/03/2014</a:t>
             </a:fld>
             <a:endParaRPr lang="en-IE"/>
           </a:p>
@@ -2118,7 +2118,7 @@
           <a:p>
             <a:fld id="{6FA70D29-463A-43D6-BBEF-693D30580A1C}" type="datetimeFigureOut">
               <a:rPr lang="en-IE" smtClean="0"/>
-              <a:t>24/03/2014</a:t>
+              <a:t>26/03/2014</a:t>
             </a:fld>
             <a:endParaRPr lang="en-IE"/>
           </a:p>
@@ -2298,7 +2298,7 @@
           <a:p>
             <a:fld id="{6FA70D29-463A-43D6-BBEF-693D30580A1C}" type="datetimeFigureOut">
               <a:rPr lang="en-IE" smtClean="0"/>
-              <a:t>24/03/2014</a:t>
+              <a:t>26/03/2014</a:t>
             </a:fld>
             <a:endParaRPr lang="en-IE"/>
           </a:p>
@@ -2704,7 +2704,7 @@
           <a:p>
             <a:fld id="{6FA70D29-463A-43D6-BBEF-693D30580A1C}" type="datetimeFigureOut">
               <a:rPr lang="en-IE" smtClean="0"/>
-              <a:t>24/03/2014</a:t>
+              <a:t>26/03/2014</a:t>
             </a:fld>
             <a:endParaRPr lang="en-IE"/>
           </a:p>
@@ -2950,7 +2950,7 @@
           <a:p>
             <a:fld id="{6FA70D29-463A-43D6-BBEF-693D30580A1C}" type="datetimeFigureOut">
               <a:rPr lang="en-IE" smtClean="0"/>
-              <a:t>24/03/2014</a:t>
+              <a:t>26/03/2014</a:t>
             </a:fld>
             <a:endParaRPr lang="en-IE"/>
           </a:p>
@@ -3238,7 +3238,7 @@
           <a:p>
             <a:fld id="{6FA70D29-463A-43D6-BBEF-693D30580A1C}" type="datetimeFigureOut">
               <a:rPr lang="en-IE" smtClean="0"/>
-              <a:t>24/03/2014</a:t>
+              <a:t>26/03/2014</a:t>
             </a:fld>
             <a:endParaRPr lang="en-IE"/>
           </a:p>
@@ -3660,7 +3660,7 @@
           <a:p>
             <a:fld id="{6FA70D29-463A-43D6-BBEF-693D30580A1C}" type="datetimeFigureOut">
               <a:rPr lang="en-IE" smtClean="0"/>
-              <a:t>24/03/2014</a:t>
+              <a:t>26/03/2014</a:t>
             </a:fld>
             <a:endParaRPr lang="en-IE"/>
           </a:p>
@@ -3778,7 +3778,7 @@
           <a:p>
             <a:fld id="{6FA70D29-463A-43D6-BBEF-693D30580A1C}" type="datetimeFigureOut">
               <a:rPr lang="en-IE" smtClean="0"/>
-              <a:t>24/03/2014</a:t>
+              <a:t>26/03/2014</a:t>
             </a:fld>
             <a:endParaRPr lang="en-IE"/>
           </a:p>
@@ -3873,7 +3873,7 @@
           <a:p>
             <a:fld id="{6FA70D29-463A-43D6-BBEF-693D30580A1C}" type="datetimeFigureOut">
               <a:rPr lang="en-IE" smtClean="0"/>
-              <a:t>24/03/2014</a:t>
+              <a:t>26/03/2014</a:t>
             </a:fld>
             <a:endParaRPr lang="en-IE"/>
           </a:p>
@@ -4150,7 +4150,7 @@
           <a:p>
             <a:fld id="{6FA70D29-463A-43D6-BBEF-693D30580A1C}" type="datetimeFigureOut">
               <a:rPr lang="en-IE" smtClean="0"/>
-              <a:t>24/03/2014</a:t>
+              <a:t>26/03/2014</a:t>
             </a:fld>
             <a:endParaRPr lang="en-IE"/>
           </a:p>
@@ -4403,7 +4403,7 @@
           <a:p>
             <a:fld id="{6FA70D29-463A-43D6-BBEF-693D30580A1C}" type="datetimeFigureOut">
               <a:rPr lang="en-IE" smtClean="0"/>
-              <a:t>24/03/2014</a:t>
+              <a:t>26/03/2014</a:t>
             </a:fld>
             <a:endParaRPr lang="en-IE"/>
           </a:p>
@@ -4616,7 +4616,7 @@
           <a:p>
             <a:fld id="{6FA70D29-463A-43D6-BBEF-693D30580A1C}" type="datetimeFigureOut">
               <a:rPr lang="en-IE" smtClean="0"/>
-              <a:t>24/03/2014</a:t>
+              <a:t>26/03/2014</a:t>
             </a:fld>
             <a:endParaRPr lang="en-IE"/>
           </a:p>
@@ -5093,18 +5093,31 @@
           <a:p>
             <a:r>
               <a:rPr lang="en-IE" dirty="0" smtClean="0"/>
-              <a:t>Game AI</a:t>
-            </a:r>
-            <a:br>
-              <a:rPr lang="en-IE" dirty="0" smtClean="0"/>
-            </a:br>
-            <a:r>
-              <a:rPr lang="en-IE" dirty="0" smtClean="0"/>
-              <a:t>(Game Engines 2</a:t>
-            </a:r>
-            <a:r>
-              <a:rPr lang="en-IE" dirty="0" smtClean="0"/>
-              <a:t>)</a:t>
+              <a:t>Game </a:t>
+            </a:r>
+            <a:r>
+              <a:rPr lang="en-IE" dirty="0" smtClean="0"/>
+              <a:t>AI</a:t>
+            </a:r>
+            <a:r>
+              <a:rPr lang="en-IE" dirty="0"/>
+              <a:t>/</a:t>
+            </a:r>
+            <a:r>
+              <a:rPr lang="en-IE" dirty="0" smtClean="0"/>
+              <a:t>Game </a:t>
+            </a:r>
+            <a:r>
+              <a:rPr lang="en-IE" dirty="0" smtClean="0"/>
+              <a:t>Engines </a:t>
+            </a:r>
+            <a:r>
+              <a:rPr lang="en-IE" dirty="0" smtClean="0"/>
+              <a:t>2</a:t>
+            </a:r>
+            <a:r>
+              <a:rPr lang="en-IE" dirty="0" smtClean="0"/>
+              <a:t/>
             </a:r>
             <a:br>
               <a:rPr lang="en-IE" dirty="0" smtClean="0"/>

</xml_diff>